<commit_message>
Update IDEAS FOR PROBLEM STATEMENT 4.pptx
</commit_message>
<xml_diff>
--- a/IDEAS FOR PROBLEM STATEMENT 4.pptx
+++ b/IDEAS FOR PROBLEM STATEMENT 4.pptx
@@ -35,6 +35,13 @@
       <p:bold r:id="rId17"/>
       <p:italic r:id="rId18"/>
       <p:boldItalic r:id="rId19"/>
+    </p:embeddedFont>
+    <p:embeddedFont>
+      <p:font typeface="Calibri" panose="020F0502020204030204" charset="0"/>
+      <p:regular r:id="rId20"/>
+      <p:bold r:id="rId21"/>
+      <p:italic r:id="rId22"/>
+      <p:boldItalic r:id="rId23"/>
     </p:embeddedFont>
   </p:embeddedFontLst>
   <p:defaultTextStyle>
@@ -8491,6 +8498,34 @@
               </a:spcAft>
               <a:buNone/>
             </a:pPr>
+            <a:r>
+              <a:rPr lang="en-US" sz="2000" dirty="0">
+                <a:latin typeface="Calibri" panose="020F0502020204030204" charset="0"/>
+                <a:cs typeface="Calibri" panose="020F0502020204030204" charset="0"/>
+                <a:sym typeface="+mn-ea"/>
+              </a:rPr>
+              <a:t>Infant Cry Language Analysis and Recognition:</a:t>
+            </a:r>
+            <a:br>
+              <a:rPr lang="en-US" b="1" dirty="0">
+                <a:latin typeface="Calibri" panose="020F0502020204030204" charset="0"/>
+                <a:cs typeface="Calibri" panose="020F0502020204030204" charset="0"/>
+              </a:rPr>
+            </a:br>
+            <a:r>
+              <a:rPr lang="en-IN" altLang="en-US" dirty="0">
+                <a:sym typeface="+mn-ea"/>
+              </a:rPr>
+              <a:t>   </a:t>
+            </a:r>
+            <a:r>
+              <a:rPr lang="en-IN" altLang="en-US" dirty="0">
+                <a:latin typeface="Calibri" panose="020F0502020204030204" charset="0"/>
+                <a:cs typeface="Calibri" panose="020F0502020204030204" charset="0"/>
+                <a:sym typeface="+mn-ea"/>
+              </a:rPr>
+              <a:t> </a:t>
+            </a:r>
           </a:p>
         </p:txBody>
       </p:sp>
@@ -8504,7 +8539,7 @@
         </p:nvSpPr>
         <p:spPr>
           <a:xfrm>
-            <a:off x="729450" y="2078875"/>
+            <a:off x="729450" y="1854085"/>
             <a:ext cx="7688700" cy="2261100"/>
           </a:xfrm>
           <a:prstGeom prst="rect">
@@ -8526,6 +8561,207 @@
               </a:spcAft>
               <a:buNone/>
             </a:pPr>
+            <a:r>
+              <a:rPr lang="en-IN" altLang="en-US" sz="1400" dirty="0">
+                <a:solidFill>
+                  <a:schemeClr val="bg2"/>
+                </a:solidFill>
+                <a:latin typeface="Calibri" panose="020F0502020204030204" charset="0"/>
+                <a:cs typeface="Calibri" panose="020F0502020204030204" charset="0"/>
+                <a:sym typeface="+mn-ea"/>
+              </a:rPr>
+              <a:t>Determine the reason for cry of the infants may be </a:t>
+            </a:r>
+            <a:r>
+              <a:rPr lang="en-IN" altLang="en-US" sz="1400" dirty="0" err="1">
+                <a:solidFill>
+                  <a:schemeClr val="bg2"/>
+                </a:solidFill>
+                <a:latin typeface="Calibri" panose="020F0502020204030204" charset="0"/>
+                <a:cs typeface="Calibri" panose="020F0502020204030204" charset="0"/>
+                <a:sym typeface="+mn-ea"/>
+              </a:rPr>
+              <a:t>hunger,sleepy,pain</a:t>
+            </a:r>
+            <a:r>
+              <a:rPr lang="en-IN" altLang="en-US" sz="1400" dirty="0">
+                <a:solidFill>
+                  <a:schemeClr val="bg2"/>
+                </a:solidFill>
+                <a:latin typeface="Calibri" panose="020F0502020204030204" charset="0"/>
+                <a:cs typeface="Calibri" panose="020F0502020204030204" charset="0"/>
+                <a:sym typeface="+mn-ea"/>
+              </a:rPr>
+              <a:t> </a:t>
+            </a:r>
+            <a:br>
+              <a:rPr lang="en-IN" altLang="en-US" dirty="0">
+                <a:latin typeface="Calibri" panose="020F0502020204030204" charset="0"/>
+                <a:cs typeface="Calibri" panose="020F0502020204030204" charset="0"/>
+                <a:sym typeface="+mn-ea"/>
+              </a:rPr>
+            </a:br>
+            <a:r>
+              <a:rPr lang="en-IN" altLang="en-US" dirty="0">
+                <a:solidFill>
+                  <a:srgbClr val="00B0F0"/>
+                </a:solidFill>
+                <a:latin typeface="Calibri" panose="020F0502020204030204" charset="0"/>
+                <a:cs typeface="Calibri" panose="020F0502020204030204" charset="0"/>
+                <a:sym typeface="+mn-ea"/>
+              </a:rPr>
+              <a:t>https://www.pond5.com/sound-effects/tag/crying-baby/#1</a:t>
+            </a:r>
+            <a:endParaRPr lang="en-IN" altLang="en-US" dirty="0">
+              <a:solidFill>
+                <a:srgbClr val="0070C0"/>
+              </a:solidFill>
+              <a:latin typeface="Calibri" panose="020F0502020204030204" charset="0"/>
+              <a:cs typeface="Calibri" panose="020F0502020204030204" charset="0"/>
+              <a:sym typeface="+mn-ea"/>
+            </a:endParaRPr>
+          </a:p>
+          <a:p>
+            <a:pPr marL="0" lvl="0" indent="0" algn="l" rtl="0">
+              <a:spcBef>
+                <a:spcPts val="0"/>
+              </a:spcBef>
+              <a:spcAft>
+                <a:spcPts val="1600"/>
+              </a:spcAft>
+              <a:buNone/>
+            </a:pPr>
+            <a:r>
+              <a:rPr lang="en-IN" altLang="en-US" sz="1800" b="1" dirty="0">
+                <a:solidFill>
+                  <a:schemeClr val="bg2"/>
+                </a:solidFill>
+                <a:latin typeface="Calibri" panose="020F0502020204030204" charset="0"/>
+                <a:cs typeface="Calibri" panose="020F0502020204030204" charset="0"/>
+                <a:sym typeface="+mn-ea"/>
+              </a:rPr>
+              <a:t>Emojify – Create your own emoji with Deep Learning :</a:t>
+            </a:r>
+            <a:endParaRPr lang="en-IN" altLang="en-US" sz="1800" b="1" dirty="0">
+              <a:solidFill>
+                <a:schemeClr val="bg2"/>
+              </a:solidFill>
+              <a:latin typeface="Calibri" panose="020F0502020204030204" charset="0"/>
+              <a:cs typeface="Calibri" panose="020F0502020204030204" charset="0"/>
+              <a:sym typeface="+mn-ea"/>
+            </a:endParaRPr>
+          </a:p>
+          <a:p>
+            <a:pPr marL="0" lvl="0" indent="0" algn="l" rtl="0">
+              <a:lnSpc>
+                <a:spcPct val="100000"/>
+              </a:lnSpc>
+              <a:spcBef>
+                <a:spcPts val="0"/>
+              </a:spcBef>
+              <a:spcAft>
+                <a:spcPts val="1600"/>
+              </a:spcAft>
+              <a:buNone/>
+            </a:pPr>
+            <a:r>
+              <a:rPr lang="en-IN" altLang="en-US" sz="1400" dirty="0">
+                <a:solidFill>
+                  <a:schemeClr val="bg2"/>
+                </a:solidFill>
+                <a:latin typeface="Calibri" panose="020F0502020204030204" charset="0"/>
+                <a:cs typeface="Calibri" panose="020F0502020204030204" charset="0"/>
+                <a:sym typeface="+mn-ea"/>
+              </a:rPr>
+              <a:t>Get the emoji of the humans facial expression.</a:t>
+            </a:r>
+            <a:endParaRPr lang="en-IN" altLang="en-US" sz="1400" dirty="0">
+              <a:solidFill>
+                <a:schemeClr val="bg2"/>
+              </a:solidFill>
+              <a:latin typeface="Calibri" panose="020F0502020204030204" charset="0"/>
+              <a:cs typeface="Calibri" panose="020F0502020204030204" charset="0"/>
+              <a:sym typeface="+mn-ea"/>
+            </a:endParaRPr>
+          </a:p>
+          <a:p>
+            <a:pPr marL="0" lvl="0" indent="0" algn="l" rtl="0">
+              <a:lnSpc>
+                <a:spcPct val="100000"/>
+              </a:lnSpc>
+              <a:spcBef>
+                <a:spcPts val="0"/>
+              </a:spcBef>
+              <a:spcAft>
+                <a:spcPts val="1600"/>
+              </a:spcAft>
+              <a:buNone/>
+            </a:pPr>
+            <a:r>
+              <a:rPr lang="en-IN" altLang="en-US" sz="1200" dirty="0">
+                <a:solidFill>
+                  <a:srgbClr val="00B0F0"/>
+                </a:solidFill>
+                <a:latin typeface="Calibri" panose="020F0502020204030204" charset="0"/>
+                <a:cs typeface="Calibri" panose="020F0502020204030204" charset="0"/>
+                <a:sym typeface="+mn-ea"/>
+              </a:rPr>
+              <a:t>https://github.com/EvilPort2/emojify</a:t>
+            </a:r>
+            <a:endParaRPr lang="en-IN" altLang="en-US" sz="1200" dirty="0">
+              <a:solidFill>
+                <a:srgbClr val="00B0F0"/>
+              </a:solidFill>
+              <a:latin typeface="Calibri" panose="020F0502020204030204" charset="0"/>
+              <a:cs typeface="Calibri" panose="020F0502020204030204" charset="0"/>
+              <a:sym typeface="+mn-ea"/>
+            </a:endParaRPr>
+          </a:p>
+          <a:p>
+            <a:pPr marL="0" lvl="0" indent="0" algn="l" rtl="0">
+              <a:spcBef>
+                <a:spcPts val="0"/>
+              </a:spcBef>
+              <a:spcAft>
+                <a:spcPts val="1600"/>
+              </a:spcAft>
+              <a:buNone/>
+            </a:pPr>
+            <a:endParaRPr lang="en-IN" altLang="en-US" sz="1400" b="1" dirty="0">
+              <a:solidFill>
+                <a:schemeClr val="bg2"/>
+              </a:solidFill>
+              <a:latin typeface="Calibri" panose="020F0502020204030204" charset="0"/>
+              <a:cs typeface="Calibri" panose="020F0502020204030204" charset="0"/>
+              <a:sym typeface="+mn-ea"/>
+            </a:endParaRPr>
+          </a:p>
+          <a:p>
+            <a:pPr marL="0" lvl="0" indent="0" algn="l" rtl="0">
+              <a:spcBef>
+                <a:spcPts val="0"/>
+              </a:spcBef>
+              <a:spcAft>
+                <a:spcPts val="1600"/>
+              </a:spcAft>
+              <a:buNone/>
+            </a:pPr>
+            <a:endParaRPr lang="en-IN" altLang="en-US" dirty="0">
+              <a:latin typeface="Calibri" panose="020F0502020204030204" charset="0"/>
+              <a:cs typeface="Calibri" panose="020F0502020204030204" charset="0"/>
+              <a:sym typeface="+mn-ea"/>
+            </a:endParaRPr>
+          </a:p>
+          <a:p>
+            <a:pPr marL="0" lvl="0" indent="0" algn="l" rtl="0">
+              <a:spcBef>
+                <a:spcPts val="0"/>
+              </a:spcBef>
+              <a:spcAft>
+                <a:spcPts val="1600"/>
+              </a:spcAft>
+              <a:buNone/>
+            </a:pPr>
           </a:p>
         </p:txBody>
       </p:sp>
@@ -8537,8 +8773,8 @@
         </p:nvSpPr>
         <p:spPr>
           <a:xfrm>
-            <a:off x="8014335" y="4793615"/>
-            <a:ext cx="1270000" cy="306705"/>
+            <a:off x="6405245" y="4284345"/>
+            <a:ext cx="1682115" cy="306705"/>
           </a:xfrm>
           <a:prstGeom prst="rect">
             <a:avLst/>
@@ -8555,9 +8791,16 @@
                 <a:latin typeface="Times New Roman" panose="02020603050405020304" charset="0"/>
                 <a:cs typeface="Times New Roman" panose="02020603050405020304" charset="0"/>
               </a:rPr>
-              <a:t>Madhurika</a:t>
+              <a:t>Madhurika </a:t>
             </a:r>
-            <a:endParaRPr lang="en-US">
+            <a:r>
+              <a:rPr lang="en-IN" altLang="en-US">
+                <a:latin typeface="Times New Roman" panose="02020603050405020304" charset="0"/>
+                <a:cs typeface="Times New Roman" panose="02020603050405020304" charset="0"/>
+              </a:rPr>
+              <a:t>Ganiger</a:t>
+            </a:r>
+            <a:endParaRPr lang="en-IN" altLang="en-US">
               <a:latin typeface="Times New Roman" panose="02020603050405020304" charset="0"/>
               <a:cs typeface="Times New Roman" panose="02020603050405020304" charset="0"/>
             </a:endParaRPr>

</xml_diff>